<commit_message>
minor change; added SSL/TLS pictures to explain
</commit_message>
<xml_diff>
--- a/slides/web-security-slides.pptx
+++ b/slides/web-security-slides.pptx
@@ -10,12 +10,15 @@
   <p:sldIdLst>
     <p:sldId id="258" r:id="rId5"/>
     <p:sldId id="259" r:id="rId6"/>
-    <p:sldId id="263" r:id="rId7"/>
-    <p:sldId id="264" r:id="rId8"/>
-    <p:sldId id="265" r:id="rId9"/>
-    <p:sldId id="261" r:id="rId10"/>
-    <p:sldId id="260" r:id="rId11"/>
-    <p:sldId id="262" r:id="rId12"/>
+    <p:sldId id="267" r:id="rId7"/>
+    <p:sldId id="268" r:id="rId8"/>
+    <p:sldId id="266" r:id="rId9"/>
+    <p:sldId id="270" r:id="rId10"/>
+    <p:sldId id="264" r:id="rId11"/>
+    <p:sldId id="265" r:id="rId12"/>
+    <p:sldId id="261" r:id="rId13"/>
+    <p:sldId id="260" r:id="rId14"/>
+    <p:sldId id="262" r:id="rId15"/>
   </p:sldIdLst>
   <p:sldSz cx="12192000" cy="6858000"/>
   <p:notesSz cx="6858000" cy="9144000"/>
@@ -114,6 +117,11 @@
       </a:defRPr>
     </a:lvl9pPr>
   </p:defaultTextStyle>
+  <p:extLst>
+    <p:ext uri="{EFAFB233-063F-42B5-8137-9DF3F51BA10A}">
+      <p15:sldGuideLst xmlns:p15="http://schemas.microsoft.com/office/powerpoint/2012/main"/>
+    </p:ext>
+  </p:extLst>
 </p:presentation>
 </file>
 
@@ -10031,6 +10039,502 @@
 </p:sld>
 </file>
 
+<file path=ppt/slides/slide10.xml><?xml version="1.0" encoding="utf-8"?>
+<p:sld xmlns:a="http://schemas.openxmlformats.org/drawingml/2006/main" xmlns:r="http://schemas.openxmlformats.org/officeDocument/2006/relationships" xmlns:p="http://schemas.openxmlformats.org/presentationml/2006/main">
+  <p:cSld>
+    <p:spTree>
+      <p:nvGrpSpPr>
+        <p:cNvPr id="1" name=""/>
+        <p:cNvGrpSpPr/>
+        <p:nvPr/>
+      </p:nvGrpSpPr>
+      <p:grpSpPr>
+        <a:xfrm>
+          <a:off x="0" y="0"/>
+          <a:ext cx="0" cy="0"/>
+          <a:chOff x="0" y="0"/>
+          <a:chExt cx="0" cy="0"/>
+        </a:xfrm>
+      </p:grpSpPr>
+      <p:pic>
+        <p:nvPicPr>
+          <p:cNvPr id="2" name="Picture Placeholder 6">
+            <a:extLst>
+              <a:ext uri="{FF2B5EF4-FFF2-40B4-BE49-F238E27FC236}">
+                <a16:creationId xmlns:a16="http://schemas.microsoft.com/office/drawing/2014/main" id="{523AF2E7-F04C-4FDF-BC0D-08056D3DC6FC}"/>
+              </a:ext>
+            </a:extLst>
+          </p:cNvPr>
+          <p:cNvPicPr/>
+          <p:nvPr/>
+        </p:nvPicPr>
+        <p:blipFill>
+          <a:blip r:embed="rId2"/>
+          <a:stretch/>
+        </p:blipFill>
+        <p:spPr>
+          <a:xfrm>
+            <a:off x="9134573" y="1088091"/>
+            <a:ext cx="3057427" cy="4666346"/>
+          </a:xfrm>
+          <a:prstGeom prst="rect">
+            <a:avLst/>
+          </a:prstGeom>
+          <a:ln w="9360">
+            <a:solidFill>
+              <a:schemeClr val="bg1"/>
+            </a:solidFill>
+            <a:round/>
+          </a:ln>
+        </p:spPr>
+      </p:pic>
+      <p:sp>
+        <p:nvSpPr>
+          <p:cNvPr id="3" name="CustomShape 2">
+            <a:extLst>
+              <a:ext uri="{FF2B5EF4-FFF2-40B4-BE49-F238E27FC236}">
+                <a16:creationId xmlns:a16="http://schemas.microsoft.com/office/drawing/2014/main" id="{FDFAB5C5-6731-42FB-BCB9-350B21D4E848}"/>
+              </a:ext>
+            </a:extLst>
+          </p:cNvPr>
+          <p:cNvSpPr/>
+          <p:nvPr/>
+        </p:nvSpPr>
+        <p:spPr>
+          <a:xfrm>
+            <a:off x="3304518" y="3136447"/>
+            <a:ext cx="3645720" cy="585106"/>
+          </a:xfrm>
+          <a:prstGeom prst="rect">
+            <a:avLst/>
+          </a:prstGeom>
+          <a:noFill/>
+          <a:ln>
+            <a:noFill/>
+          </a:ln>
+        </p:spPr>
+        <p:style>
+          <a:lnRef idx="0">
+            <a:scrgbClr r="0" g="0" b="0"/>
+          </a:lnRef>
+          <a:fillRef idx="0">
+            <a:scrgbClr r="0" g="0" b="0"/>
+          </a:fillRef>
+          <a:effectRef idx="0">
+            <a:scrgbClr r="0" g="0" b="0"/>
+          </a:effectRef>
+          <a:fontRef idx="minor"/>
+        </p:style>
+        <p:txBody>
+          <a:bodyPr lIns="0" tIns="0" rIns="0" bIns="0"/>
+          <a:lstStyle/>
+          <a:p>
+            <a:pPr>
+              <a:lnSpc>
+                <a:spcPct val="120000"/>
+              </a:lnSpc>
+            </a:pPr>
+            <a:r>
+              <a:rPr lang="en-US" sz="3200" b="0" strike="noStrike" spc="-1" dirty="0">
+                <a:solidFill>
+                  <a:srgbClr val="FFFFFF"/>
+                </a:solidFill>
+                <a:latin typeface="Arial"/>
+                <a:ea typeface="DejaVu Sans"/>
+              </a:rPr>
+              <a:t>Questions?</a:t>
+            </a:r>
+            <a:endParaRPr lang="en-US" sz="3200" b="0" strike="noStrike" spc="-1" dirty="0">
+              <a:latin typeface="Arial"/>
+            </a:endParaRPr>
+          </a:p>
+        </p:txBody>
+      </p:sp>
+      <p:sp>
+        <p:nvSpPr>
+          <p:cNvPr id="4" name="CustomShape 2">
+            <a:extLst>
+              <a:ext uri="{FF2B5EF4-FFF2-40B4-BE49-F238E27FC236}">
+                <a16:creationId xmlns:a16="http://schemas.microsoft.com/office/drawing/2014/main" id="{91EBE4E4-8EA5-4197-958A-B0A51A430A5C}"/>
+              </a:ext>
+            </a:extLst>
+          </p:cNvPr>
+          <p:cNvSpPr/>
+          <p:nvPr/>
+        </p:nvSpPr>
+        <p:spPr>
+          <a:xfrm>
+            <a:off x="6624000" y="6672000"/>
+            <a:ext cx="4303680" cy="127680"/>
+          </a:xfrm>
+          <a:prstGeom prst="rect">
+            <a:avLst/>
+          </a:prstGeom>
+          <a:noFill/>
+          <a:ln>
+            <a:noFill/>
+          </a:ln>
+        </p:spPr>
+        <p:style>
+          <a:lnRef idx="0">
+            <a:scrgbClr r="0" g="0" b="0"/>
+          </a:lnRef>
+          <a:fillRef idx="0">
+            <a:scrgbClr r="0" g="0" b="0"/>
+          </a:fillRef>
+          <a:effectRef idx="0">
+            <a:scrgbClr r="0" g="0" b="0"/>
+          </a:effectRef>
+          <a:fontRef idx="minor"/>
+        </p:style>
+        <p:txBody>
+          <a:bodyPr lIns="0" tIns="0" rIns="0" bIns="0"/>
+          <a:lstStyle/>
+          <a:p>
+            <a:pPr algn="r">
+              <a:lnSpc>
+                <a:spcPct val="100000"/>
+              </a:lnSpc>
+            </a:pPr>
+            <a:r>
+              <a:rPr lang="en-US" sz="800" spc="-1" dirty="0">
+                <a:solidFill>
+                  <a:srgbClr val="FFFFFF"/>
+                </a:solidFill>
+                <a:latin typeface="Arial"/>
+                <a:ea typeface="DejaVu Sans"/>
+              </a:rPr>
+              <a:t>Web-security</a:t>
+            </a:r>
+            <a:endParaRPr lang="en-US" sz="800" spc="-1" dirty="0">
+              <a:latin typeface="Arial"/>
+            </a:endParaRPr>
+          </a:p>
+        </p:txBody>
+      </p:sp>
+      <p:sp>
+        <p:nvSpPr>
+          <p:cNvPr id="5" name="CustomShape 3">
+            <a:extLst>
+              <a:ext uri="{FF2B5EF4-FFF2-40B4-BE49-F238E27FC236}">
+                <a16:creationId xmlns:a16="http://schemas.microsoft.com/office/drawing/2014/main" id="{F38F0632-E051-49A8-AF74-637F60795063}"/>
+              </a:ext>
+            </a:extLst>
+          </p:cNvPr>
+          <p:cNvSpPr/>
+          <p:nvPr/>
+        </p:nvSpPr>
+        <p:spPr>
+          <a:xfrm>
+            <a:off x="11040000" y="6672000"/>
+            <a:ext cx="175680" cy="127680"/>
+          </a:xfrm>
+          <a:prstGeom prst="rect">
+            <a:avLst/>
+          </a:prstGeom>
+          <a:noFill/>
+          <a:ln>
+            <a:noFill/>
+          </a:ln>
+        </p:spPr>
+        <p:style>
+          <a:lnRef idx="0">
+            <a:scrgbClr r="0" g="0" b="0"/>
+          </a:lnRef>
+          <a:fillRef idx="0">
+            <a:scrgbClr r="0" g="0" b="0"/>
+          </a:fillRef>
+          <a:effectRef idx="0">
+            <a:scrgbClr r="0" g="0" b="0"/>
+          </a:effectRef>
+          <a:fontRef idx="minor"/>
+        </p:style>
+        <p:txBody>
+          <a:bodyPr lIns="0" tIns="0" rIns="0" bIns="0"/>
+          <a:lstStyle/>
+          <a:p>
+            <a:pPr algn="r">
+              <a:lnSpc>
+                <a:spcPct val="100000"/>
+              </a:lnSpc>
+            </a:pPr>
+            <a:fld id="{057B226F-AE21-48F5-95C0-A8FDEB7B91DB}" type="slidenum">
+              <a:rPr lang="en-US" sz="800" spc="-1">
+                <a:solidFill>
+                  <a:srgbClr val="FFFFFF"/>
+                </a:solidFill>
+                <a:latin typeface="Arial"/>
+                <a:ea typeface="DejaVu Sans"/>
+              </a:rPr>
+              <a:t>10</a:t>
+            </a:fld>
+            <a:endParaRPr lang="en-US" sz="800" spc="-1">
+              <a:latin typeface="Arial"/>
+            </a:endParaRPr>
+          </a:p>
+        </p:txBody>
+      </p:sp>
+    </p:spTree>
+    <p:extLst>
+      <p:ext uri="{BB962C8B-B14F-4D97-AF65-F5344CB8AC3E}">
+        <p14:creationId xmlns:p14="http://schemas.microsoft.com/office/powerpoint/2010/main" val="2263330210"/>
+      </p:ext>
+    </p:extLst>
+  </p:cSld>
+  <p:clrMapOvr>
+    <a:masterClrMapping/>
+  </p:clrMapOvr>
+</p:sld>
+</file>
+
+<file path=ppt/slides/slide11.xml><?xml version="1.0" encoding="utf-8"?>
+<p:sld xmlns:a="http://schemas.openxmlformats.org/drawingml/2006/main" xmlns:r="http://schemas.openxmlformats.org/officeDocument/2006/relationships" xmlns:p="http://schemas.openxmlformats.org/presentationml/2006/main">
+  <p:cSld>
+    <p:spTree>
+      <p:nvGrpSpPr>
+        <p:cNvPr id="1" name=""/>
+        <p:cNvGrpSpPr/>
+        <p:nvPr/>
+      </p:nvGrpSpPr>
+      <p:grpSpPr>
+        <a:xfrm>
+          <a:off x="0" y="0"/>
+          <a:ext cx="0" cy="0"/>
+          <a:chOff x="0" y="0"/>
+          <a:chExt cx="0" cy="0"/>
+        </a:xfrm>
+      </p:grpSpPr>
+      <p:pic>
+        <p:nvPicPr>
+          <p:cNvPr id="2" name="Picture Placeholder 6">
+            <a:extLst>
+              <a:ext uri="{FF2B5EF4-FFF2-40B4-BE49-F238E27FC236}">
+                <a16:creationId xmlns:a16="http://schemas.microsoft.com/office/drawing/2014/main" id="{523AF2E7-F04C-4FDF-BC0D-08056D3DC6FC}"/>
+              </a:ext>
+            </a:extLst>
+          </p:cNvPr>
+          <p:cNvPicPr/>
+          <p:nvPr/>
+        </p:nvPicPr>
+        <p:blipFill>
+          <a:blip r:embed="rId2"/>
+          <a:stretch/>
+        </p:blipFill>
+        <p:spPr>
+          <a:xfrm>
+            <a:off x="9134573" y="1088091"/>
+            <a:ext cx="3057427" cy="4666346"/>
+          </a:xfrm>
+          <a:prstGeom prst="rect">
+            <a:avLst/>
+          </a:prstGeom>
+          <a:ln w="9360">
+            <a:solidFill>
+              <a:schemeClr val="bg1"/>
+            </a:solidFill>
+            <a:round/>
+          </a:ln>
+        </p:spPr>
+      </p:pic>
+      <p:sp>
+        <p:nvSpPr>
+          <p:cNvPr id="3" name="CustomShape 2">
+            <a:extLst>
+              <a:ext uri="{FF2B5EF4-FFF2-40B4-BE49-F238E27FC236}">
+                <a16:creationId xmlns:a16="http://schemas.microsoft.com/office/drawing/2014/main" id="{FDFAB5C5-6731-42FB-BCB9-350B21D4E848}"/>
+              </a:ext>
+            </a:extLst>
+          </p:cNvPr>
+          <p:cNvSpPr/>
+          <p:nvPr/>
+        </p:nvSpPr>
+        <p:spPr>
+          <a:xfrm>
+            <a:off x="3304518" y="3136447"/>
+            <a:ext cx="3645720" cy="585106"/>
+          </a:xfrm>
+          <a:prstGeom prst="rect">
+            <a:avLst/>
+          </a:prstGeom>
+          <a:noFill/>
+          <a:ln>
+            <a:noFill/>
+          </a:ln>
+        </p:spPr>
+        <p:style>
+          <a:lnRef idx="0">
+            <a:scrgbClr r="0" g="0" b="0"/>
+          </a:lnRef>
+          <a:fillRef idx="0">
+            <a:scrgbClr r="0" g="0" b="0"/>
+          </a:fillRef>
+          <a:effectRef idx="0">
+            <a:scrgbClr r="0" g="0" b="0"/>
+          </a:effectRef>
+          <a:fontRef idx="minor"/>
+        </p:style>
+        <p:txBody>
+          <a:bodyPr lIns="0" tIns="0" rIns="0" bIns="0"/>
+          <a:lstStyle/>
+          <a:p>
+            <a:pPr>
+              <a:lnSpc>
+                <a:spcPct val="120000"/>
+              </a:lnSpc>
+            </a:pPr>
+            <a:r>
+              <a:rPr lang="en-US" sz="3200" b="0" strike="noStrike" spc="-1" dirty="0">
+                <a:solidFill>
+                  <a:srgbClr val="FFFFFF"/>
+                </a:solidFill>
+                <a:latin typeface="Arial"/>
+                <a:ea typeface="DejaVu Sans"/>
+              </a:rPr>
+              <a:t>Hands-on</a:t>
+            </a:r>
+            <a:endParaRPr lang="en-US" sz="3200" b="0" strike="noStrike" spc="-1" dirty="0">
+              <a:latin typeface="Arial"/>
+            </a:endParaRPr>
+          </a:p>
+        </p:txBody>
+      </p:sp>
+      <p:sp>
+        <p:nvSpPr>
+          <p:cNvPr id="4" name="CustomShape 2">
+            <a:extLst>
+              <a:ext uri="{FF2B5EF4-FFF2-40B4-BE49-F238E27FC236}">
+                <a16:creationId xmlns:a16="http://schemas.microsoft.com/office/drawing/2014/main" id="{18D08DDF-914D-407C-A188-1C78A87DC0B1}"/>
+              </a:ext>
+            </a:extLst>
+          </p:cNvPr>
+          <p:cNvSpPr/>
+          <p:nvPr/>
+        </p:nvSpPr>
+        <p:spPr>
+          <a:xfrm>
+            <a:off x="6624000" y="6672000"/>
+            <a:ext cx="4303680" cy="127680"/>
+          </a:xfrm>
+          <a:prstGeom prst="rect">
+            <a:avLst/>
+          </a:prstGeom>
+          <a:noFill/>
+          <a:ln>
+            <a:noFill/>
+          </a:ln>
+        </p:spPr>
+        <p:style>
+          <a:lnRef idx="0">
+            <a:scrgbClr r="0" g="0" b="0"/>
+          </a:lnRef>
+          <a:fillRef idx="0">
+            <a:scrgbClr r="0" g="0" b="0"/>
+          </a:fillRef>
+          <a:effectRef idx="0">
+            <a:scrgbClr r="0" g="0" b="0"/>
+          </a:effectRef>
+          <a:fontRef idx="minor"/>
+        </p:style>
+        <p:txBody>
+          <a:bodyPr lIns="0" tIns="0" rIns="0" bIns="0"/>
+          <a:lstStyle/>
+          <a:p>
+            <a:pPr algn="r">
+              <a:lnSpc>
+                <a:spcPct val="100000"/>
+              </a:lnSpc>
+            </a:pPr>
+            <a:r>
+              <a:rPr lang="en-US" sz="800" spc="-1" dirty="0">
+                <a:solidFill>
+                  <a:srgbClr val="FFFFFF"/>
+                </a:solidFill>
+                <a:latin typeface="Arial"/>
+                <a:ea typeface="DejaVu Sans"/>
+              </a:rPr>
+              <a:t>Web-security</a:t>
+            </a:r>
+            <a:endParaRPr lang="en-US" sz="800" spc="-1" dirty="0">
+              <a:latin typeface="Arial"/>
+            </a:endParaRPr>
+          </a:p>
+        </p:txBody>
+      </p:sp>
+      <p:sp>
+        <p:nvSpPr>
+          <p:cNvPr id="5" name="CustomShape 3">
+            <a:extLst>
+              <a:ext uri="{FF2B5EF4-FFF2-40B4-BE49-F238E27FC236}">
+                <a16:creationId xmlns:a16="http://schemas.microsoft.com/office/drawing/2014/main" id="{34694A8F-3DF8-4121-8C33-527DBF03A5EA}"/>
+              </a:ext>
+            </a:extLst>
+          </p:cNvPr>
+          <p:cNvSpPr/>
+          <p:nvPr/>
+        </p:nvSpPr>
+        <p:spPr>
+          <a:xfrm>
+            <a:off x="11040000" y="6672000"/>
+            <a:ext cx="175680" cy="127680"/>
+          </a:xfrm>
+          <a:prstGeom prst="rect">
+            <a:avLst/>
+          </a:prstGeom>
+          <a:noFill/>
+          <a:ln>
+            <a:noFill/>
+          </a:ln>
+        </p:spPr>
+        <p:style>
+          <a:lnRef idx="0">
+            <a:scrgbClr r="0" g="0" b="0"/>
+          </a:lnRef>
+          <a:fillRef idx="0">
+            <a:scrgbClr r="0" g="0" b="0"/>
+          </a:fillRef>
+          <a:effectRef idx="0">
+            <a:scrgbClr r="0" g="0" b="0"/>
+          </a:effectRef>
+          <a:fontRef idx="minor"/>
+        </p:style>
+        <p:txBody>
+          <a:bodyPr lIns="0" tIns="0" rIns="0" bIns="0"/>
+          <a:lstStyle/>
+          <a:p>
+            <a:pPr algn="r">
+              <a:lnSpc>
+                <a:spcPct val="100000"/>
+              </a:lnSpc>
+            </a:pPr>
+            <a:fld id="{057B226F-AE21-48F5-95C0-A8FDEB7B91DB}" type="slidenum">
+              <a:rPr lang="en-US" sz="800" spc="-1">
+                <a:solidFill>
+                  <a:srgbClr val="FFFFFF"/>
+                </a:solidFill>
+                <a:latin typeface="Arial"/>
+                <a:ea typeface="DejaVu Sans"/>
+              </a:rPr>
+              <a:t>11</a:t>
+            </a:fld>
+            <a:endParaRPr lang="en-US" sz="800" spc="-1">
+              <a:latin typeface="Arial"/>
+            </a:endParaRPr>
+          </a:p>
+        </p:txBody>
+      </p:sp>
+    </p:spTree>
+    <p:extLst>
+      <p:ext uri="{BB962C8B-B14F-4D97-AF65-F5344CB8AC3E}">
+        <p14:creationId xmlns:p14="http://schemas.microsoft.com/office/powerpoint/2010/main" val="2206085251"/>
+      </p:ext>
+    </p:extLst>
+  </p:cSld>
+  <p:clrMapOvr>
+    <a:masterClrMapping/>
+  </p:clrMapOvr>
+</p:sld>
+</file>
+
 <file path=ppt/slides/slide2.xml><?xml version="1.0" encoding="utf-8"?>
 <p:sld xmlns:a="http://schemas.openxmlformats.org/drawingml/2006/main" xmlns:r="http://schemas.openxmlformats.org/officeDocument/2006/relationships" xmlns:p="http://schemas.openxmlformats.org/presentationml/2006/main">
   <p:cSld>
@@ -10393,6 +10897,37 @@
             <a:endParaRPr lang="en-US" sz="800" spc="-1">
               <a:latin typeface="Arial"/>
             </a:endParaRPr>
+          </a:p>
+        </p:txBody>
+      </p:sp>
+      <p:sp>
+        <p:nvSpPr>
+          <p:cNvPr id="4" name="Subtitle 3">
+            <a:extLst>
+              <a:ext uri="{FF2B5EF4-FFF2-40B4-BE49-F238E27FC236}">
+                <a16:creationId xmlns:a16="http://schemas.microsoft.com/office/drawing/2014/main" id="{895D9B8F-5290-435C-92BD-05455CC586C1}"/>
+              </a:ext>
+            </a:extLst>
+          </p:cNvPr>
+          <p:cNvSpPr>
+            <a:spLocks noGrp="1"/>
+          </p:cNvSpPr>
+          <p:nvPr>
+            <p:ph type="subTitle"/>
+          </p:nvPr>
+        </p:nvSpPr>
+        <p:spPr/>
+        <p:txBody>
+          <a:bodyPr anchor="t">
+            <a:normAutofit/>
+          </a:bodyPr>
+          <a:lstStyle/>
+          <a:p>
+            <a:r>
+              <a:rPr lang="en-US" sz="2400" dirty="0"/>
+              <a:t>Secure Socket Layer (deprecated) / Transport Layer Security</a:t>
+            </a:r>
+            <a:endParaRPr lang="en-NL" sz="2400" dirty="0"/>
           </a:p>
         </p:txBody>
       </p:sp>
@@ -10496,7 +11031,7 @@
                 <a:latin typeface="Arial"/>
                 <a:ea typeface="DejaVu Sans"/>
               </a:rPr>
-              <a:t>JWT</a:t>
+              <a:t>SSL / TLS</a:t>
             </a:r>
             <a:endParaRPr lang="en-US" sz="2400" spc="-1" dirty="0">
               <a:latin typeface="Arial"/>
@@ -10796,10 +11331,57 @@
           </a:p>
         </p:txBody>
       </p:sp>
+      <p:pic>
+        <p:nvPicPr>
+          <p:cNvPr id="2050" name="Picture 2" descr="Related image">
+            <a:extLst>
+              <a:ext uri="{FF2B5EF4-FFF2-40B4-BE49-F238E27FC236}">
+                <a16:creationId xmlns:a16="http://schemas.microsoft.com/office/drawing/2014/main" id="{E3616B8C-8CC9-4D6C-9D19-0ECD3C8E5F13}"/>
+              </a:ext>
+            </a:extLst>
+          </p:cNvPr>
+          <p:cNvPicPr>
+            <a:picLocks noChangeAspect="1" noChangeArrowheads="1"/>
+          </p:cNvPicPr>
+          <p:nvPr/>
+        </p:nvPicPr>
+        <p:blipFill>
+          <a:blip r:embed="rId2">
+            <a:extLst>
+              <a:ext uri="{28A0092B-C50C-407E-A947-70E740481C1C}">
+                <a14:useLocalDpi xmlns:a14="http://schemas.microsoft.com/office/drawing/2010/main" val="0"/>
+              </a:ext>
+            </a:extLst>
+          </a:blip>
+          <a:srcRect/>
+          <a:stretch>
+            <a:fillRect/>
+          </a:stretch>
+        </p:blipFill>
+        <p:spPr bwMode="auto">
+          <a:xfrm>
+            <a:off x="3218416" y="384000"/>
+            <a:ext cx="6400784" cy="6002037"/>
+          </a:xfrm>
+          <a:prstGeom prst="rect">
+            <a:avLst/>
+          </a:prstGeom>
+          <a:noFill/>
+          <a:extLst>
+            <a:ext uri="{909E8E84-426E-40DD-AFC4-6F175D3DCCD1}">
+              <a14:hiddenFill xmlns:a14="http://schemas.microsoft.com/office/drawing/2010/main">
+                <a:solidFill>
+                  <a:srgbClr val="FFFFFF"/>
+                </a:solidFill>
+              </a14:hiddenFill>
+            </a:ext>
+          </a:extLst>
+        </p:spPr>
+      </p:pic>
     </p:spTree>
     <p:extLst>
       <p:ext uri="{BB962C8B-B14F-4D97-AF65-F5344CB8AC3E}">
-        <p14:creationId xmlns:p14="http://schemas.microsoft.com/office/powerpoint/2010/main" val="1162863429"/>
+        <p14:creationId xmlns:p14="http://schemas.microsoft.com/office/powerpoint/2010/main" val="2814780270"/>
       </p:ext>
     </p:extLst>
   </p:cSld>
@@ -10901,7 +11483,7 @@
                 <a:latin typeface="Arial"/>
                 <a:ea typeface="DejaVu Sans"/>
               </a:rPr>
-              <a:t>XSS</a:t>
+              <a:t>SSL / TLS</a:t>
             </a:r>
             <a:endParaRPr lang="en-US" sz="2400" spc="-1" dirty="0">
               <a:latin typeface="Arial"/>
@@ -11201,10 +11783,57 @@
           </a:p>
         </p:txBody>
       </p:sp>
+      <p:pic>
+        <p:nvPicPr>
+          <p:cNvPr id="3074" name="Picture 2" descr="Image result for SSL explained">
+            <a:extLst>
+              <a:ext uri="{FF2B5EF4-FFF2-40B4-BE49-F238E27FC236}">
+                <a16:creationId xmlns:a16="http://schemas.microsoft.com/office/drawing/2014/main" id="{BA83EB7D-4E2B-4BAA-AA5D-47F1B543A89B}"/>
+              </a:ext>
+            </a:extLst>
+          </p:cNvPr>
+          <p:cNvPicPr>
+            <a:picLocks noChangeAspect="1" noChangeArrowheads="1"/>
+          </p:cNvPicPr>
+          <p:nvPr/>
+        </p:nvPicPr>
+        <p:blipFill>
+          <a:blip r:embed="rId2">
+            <a:extLst>
+              <a:ext uri="{28A0092B-C50C-407E-A947-70E740481C1C}">
+                <a14:useLocalDpi xmlns:a14="http://schemas.microsoft.com/office/drawing/2010/main" val="0"/>
+              </a:ext>
+            </a:extLst>
+          </a:blip>
+          <a:srcRect/>
+          <a:stretch>
+            <a:fillRect/>
+          </a:stretch>
+        </p:blipFill>
+        <p:spPr bwMode="auto">
+          <a:xfrm>
+            <a:off x="3228975" y="2747963"/>
+            <a:ext cx="5734050" cy="1362075"/>
+          </a:xfrm>
+          <a:prstGeom prst="rect">
+            <a:avLst/>
+          </a:prstGeom>
+          <a:noFill/>
+          <a:extLst>
+            <a:ext uri="{909E8E84-426E-40DD-AFC4-6F175D3DCCD1}">
+              <a14:hiddenFill xmlns:a14="http://schemas.microsoft.com/office/drawing/2010/main">
+                <a:solidFill>
+                  <a:srgbClr val="FFFFFF"/>
+                </a:solidFill>
+              </a14:hiddenFill>
+            </a:ext>
+          </a:extLst>
+        </p:spPr>
+      </p:pic>
     </p:spTree>
     <p:extLst>
       <p:ext uri="{BB962C8B-B14F-4D97-AF65-F5344CB8AC3E}">
-        <p14:creationId xmlns:p14="http://schemas.microsoft.com/office/powerpoint/2010/main" val="3961011946"/>
+        <p14:creationId xmlns:p14="http://schemas.microsoft.com/office/powerpoint/2010/main" val="2383090194"/>
       </p:ext>
     </p:extLst>
   </p:cSld>
@@ -11299,14 +11928,14 @@
               </a:lnSpc>
             </a:pPr>
             <a:r>
-              <a:rPr lang="en-US" sz="2400" b="1" spc="-1">
+              <a:rPr lang="en-US" sz="2400" b="1" spc="-1" dirty="0">
                 <a:solidFill>
                   <a:srgbClr val="E63232"/>
                 </a:solidFill>
                 <a:latin typeface="Arial"/>
                 <a:ea typeface="DejaVu Sans"/>
               </a:rPr>
-              <a:t>CSRF</a:t>
+              <a:t>JWT</a:t>
             </a:r>
             <a:endParaRPr lang="en-US" sz="2400" spc="-1" dirty="0">
               <a:latin typeface="Arial"/>
@@ -11599,6 +12228,1231 @@
                 <a:ea typeface="DejaVu Sans"/>
               </a:rPr>
               <a:t>5</a:t>
+            </a:fld>
+            <a:endParaRPr lang="en-US" sz="800" spc="-1">
+              <a:latin typeface="Arial"/>
+            </a:endParaRPr>
+          </a:p>
+        </p:txBody>
+      </p:sp>
+    </p:spTree>
+    <p:extLst>
+      <p:ext uri="{BB962C8B-B14F-4D97-AF65-F5344CB8AC3E}">
+        <p14:creationId xmlns:p14="http://schemas.microsoft.com/office/powerpoint/2010/main" val="143285843"/>
+      </p:ext>
+    </p:extLst>
+  </p:cSld>
+  <p:clrMapOvr>
+    <a:masterClrMapping/>
+  </p:clrMapOvr>
+  <p:timing>
+    <p:tnLst>
+      <p:par>
+        <p:cTn id="1" dur="indefinite" restart="never" nodeType="tmRoot">
+          <p:childTnLst>
+            <p:seq>
+              <p:cTn id="2" dur="indefinite" nodeType="mainSeq"/>
+              <p:prevCondLst>
+                <p:cond evt="onPrev" delay="0">
+                  <p:tgtEl>
+                    <p:sldTgt/>
+                  </p:tgtEl>
+                </p:cond>
+              </p:prevCondLst>
+              <p:nextCondLst>
+                <p:cond evt="onNext" delay="0">
+                  <p:tgtEl>
+                    <p:sldTgt/>
+                  </p:tgtEl>
+                </p:cond>
+              </p:nextCondLst>
+            </p:seq>
+          </p:childTnLst>
+        </p:cTn>
+      </p:par>
+    </p:tnLst>
+  </p:timing>
+</p:sld>
+</file>
+
+<file path=ppt/slides/slide6.xml><?xml version="1.0" encoding="utf-8"?>
+<p:sld xmlns:a="http://schemas.openxmlformats.org/drawingml/2006/main" xmlns:r="http://schemas.openxmlformats.org/officeDocument/2006/relationships" xmlns:p="http://schemas.openxmlformats.org/presentationml/2006/main">
+  <p:cSld>
+    <p:spTree>
+      <p:nvGrpSpPr>
+        <p:cNvPr id="1" name=""/>
+        <p:cNvGrpSpPr/>
+        <p:nvPr/>
+      </p:nvGrpSpPr>
+      <p:grpSpPr>
+        <a:xfrm>
+          <a:off x="0" y="0"/>
+          <a:ext cx="0" cy="0"/>
+          <a:chOff x="0" y="0"/>
+          <a:chExt cx="0" cy="0"/>
+        </a:xfrm>
+      </p:grpSpPr>
+      <p:sp>
+        <p:nvSpPr>
+          <p:cNvPr id="176" name="CustomShape 1"/>
+          <p:cNvSpPr/>
+          <p:nvPr/>
+        </p:nvSpPr>
+        <p:spPr>
+          <a:xfrm>
+            <a:off x="960000" y="384000"/>
+            <a:ext cx="8815680" cy="655680"/>
+          </a:xfrm>
+          <a:prstGeom prst="rect">
+            <a:avLst/>
+          </a:prstGeom>
+          <a:noFill/>
+          <a:ln>
+            <a:noFill/>
+          </a:ln>
+        </p:spPr>
+        <p:style>
+          <a:lnRef idx="0">
+            <a:scrgbClr r="0" g="0" b="0"/>
+          </a:lnRef>
+          <a:fillRef idx="0">
+            <a:scrgbClr r="0" g="0" b="0"/>
+          </a:fillRef>
+          <a:effectRef idx="0">
+            <a:scrgbClr r="0" g="0" b="0"/>
+          </a:effectRef>
+          <a:fontRef idx="minor"/>
+        </p:style>
+        <p:txBody>
+          <a:bodyPr lIns="0" tIns="0" rIns="0" bIns="0" anchor="ctr"/>
+          <a:lstStyle/>
+          <a:p>
+            <a:pPr>
+              <a:lnSpc>
+                <a:spcPct val="85000"/>
+              </a:lnSpc>
+            </a:pPr>
+            <a:r>
+              <a:rPr lang="en-US" sz="2400" b="1" spc="-1" dirty="0">
+                <a:solidFill>
+                  <a:srgbClr val="E63232"/>
+                </a:solidFill>
+                <a:latin typeface="Arial"/>
+                <a:ea typeface="DejaVu Sans"/>
+              </a:rPr>
+              <a:t>Dynamic Routing </a:t>
+            </a:r>
+            <a:r>
+              <a:rPr lang="en-US" sz="2400" b="1" spc="-1">
+                <a:solidFill>
+                  <a:srgbClr val="E63232"/>
+                </a:solidFill>
+                <a:latin typeface="Arial"/>
+                <a:ea typeface="DejaVu Sans"/>
+              </a:rPr>
+              <a:t>/ Rendering</a:t>
+            </a:r>
+            <a:endParaRPr lang="en-US" sz="2400" spc="-1" dirty="0">
+              <a:latin typeface="Arial"/>
+            </a:endParaRPr>
+          </a:p>
+        </p:txBody>
+      </p:sp>
+      <p:sp>
+        <p:nvSpPr>
+          <p:cNvPr id="177" name="CustomShape 2"/>
+          <p:cNvSpPr/>
+          <p:nvPr/>
+        </p:nvSpPr>
+        <p:spPr>
+          <a:xfrm>
+            <a:off x="6624000" y="6672000"/>
+            <a:ext cx="4303680" cy="127680"/>
+          </a:xfrm>
+          <a:prstGeom prst="rect">
+            <a:avLst/>
+          </a:prstGeom>
+          <a:noFill/>
+          <a:ln>
+            <a:noFill/>
+          </a:ln>
+        </p:spPr>
+        <p:style>
+          <a:lnRef idx="0">
+            <a:scrgbClr r="0" g="0" b="0"/>
+          </a:lnRef>
+          <a:fillRef idx="0">
+            <a:scrgbClr r="0" g="0" b="0"/>
+          </a:fillRef>
+          <a:effectRef idx="0">
+            <a:scrgbClr r="0" g="0" b="0"/>
+          </a:effectRef>
+          <a:fontRef idx="minor"/>
+        </p:style>
+        <p:txBody>
+          <a:bodyPr lIns="0" tIns="0" rIns="0" bIns="0"/>
+          <a:lstStyle/>
+          <a:p>
+            <a:pPr algn="r">
+              <a:lnSpc>
+                <a:spcPct val="100000"/>
+              </a:lnSpc>
+            </a:pPr>
+            <a:r>
+              <a:rPr lang="en-US" sz="800" spc="-1" dirty="0">
+                <a:solidFill>
+                  <a:srgbClr val="FFFFFF"/>
+                </a:solidFill>
+                <a:latin typeface="Arial"/>
+                <a:ea typeface="DejaVu Sans"/>
+              </a:rPr>
+              <a:t>Web-security</a:t>
+            </a:r>
+            <a:endParaRPr lang="en-US" sz="800" spc="-1" dirty="0">
+              <a:latin typeface="Arial"/>
+            </a:endParaRPr>
+          </a:p>
+        </p:txBody>
+      </p:sp>
+      <p:sp>
+        <p:nvSpPr>
+          <p:cNvPr id="178" name="CustomShape 3"/>
+          <p:cNvSpPr/>
+          <p:nvPr/>
+        </p:nvSpPr>
+        <p:spPr>
+          <a:xfrm>
+            <a:off x="11040000" y="6672000"/>
+            <a:ext cx="175680" cy="127680"/>
+          </a:xfrm>
+          <a:prstGeom prst="rect">
+            <a:avLst/>
+          </a:prstGeom>
+          <a:noFill/>
+          <a:ln>
+            <a:noFill/>
+          </a:ln>
+        </p:spPr>
+        <p:style>
+          <a:lnRef idx="0">
+            <a:scrgbClr r="0" g="0" b="0"/>
+          </a:lnRef>
+          <a:fillRef idx="0">
+            <a:scrgbClr r="0" g="0" b="0"/>
+          </a:fillRef>
+          <a:effectRef idx="0">
+            <a:scrgbClr r="0" g="0" b="0"/>
+          </a:effectRef>
+          <a:fontRef idx="minor"/>
+        </p:style>
+        <p:txBody>
+          <a:bodyPr lIns="0" tIns="0" rIns="0" bIns="0"/>
+          <a:lstStyle/>
+          <a:p>
+            <a:pPr algn="r">
+              <a:lnSpc>
+                <a:spcPct val="100000"/>
+              </a:lnSpc>
+            </a:pPr>
+            <a:fld id="{057B226F-AE21-48F5-95C0-A8FDEB7B91DB}" type="slidenum">
+              <a:rPr lang="en-US" sz="800" spc="-1">
+                <a:solidFill>
+                  <a:srgbClr val="FFFFFF"/>
+                </a:solidFill>
+                <a:latin typeface="Arial"/>
+                <a:ea typeface="DejaVu Sans"/>
+              </a:rPr>
+              <a:t>6</a:t>
+            </a:fld>
+            <a:endParaRPr lang="en-US" sz="800" spc="-1">
+              <a:latin typeface="Arial"/>
+            </a:endParaRPr>
+          </a:p>
+        </p:txBody>
+      </p:sp>
+      <p:sp>
+        <p:nvSpPr>
+          <p:cNvPr id="179" name="CustomShape 4"/>
+          <p:cNvSpPr/>
+          <p:nvPr/>
+        </p:nvSpPr>
+        <p:spPr>
+          <a:xfrm>
+            <a:off x="803520" y="672960"/>
+            <a:ext cx="8815680" cy="5166720"/>
+          </a:xfrm>
+          <a:prstGeom prst="rect">
+            <a:avLst/>
+          </a:prstGeom>
+          <a:noFill/>
+          <a:ln>
+            <a:noFill/>
+          </a:ln>
+        </p:spPr>
+        <p:style>
+          <a:lnRef idx="0">
+            <a:scrgbClr r="0" g="0" b="0"/>
+          </a:lnRef>
+          <a:fillRef idx="0">
+            <a:scrgbClr r="0" g="0" b="0"/>
+          </a:fillRef>
+          <a:effectRef idx="0">
+            <a:scrgbClr r="0" g="0" b="0"/>
+          </a:effectRef>
+          <a:fontRef idx="minor"/>
+        </p:style>
+        <p:txBody>
+          <a:bodyPr lIns="0" tIns="0" rIns="0" bIns="0"/>
+          <a:lstStyle/>
+          <a:p>
+            <a:pPr>
+              <a:lnSpc>
+                <a:spcPct val="120000"/>
+              </a:lnSpc>
+            </a:pPr>
+            <a:endParaRPr lang="en-US" sz="2400" spc="-1">
+              <a:latin typeface="Arial"/>
+            </a:endParaRPr>
+          </a:p>
+          <a:p>
+            <a:pPr>
+              <a:lnSpc>
+                <a:spcPct val="120000"/>
+              </a:lnSpc>
+            </a:pPr>
+            <a:endParaRPr lang="en-US" sz="2400" spc="-1">
+              <a:latin typeface="Arial"/>
+            </a:endParaRPr>
+          </a:p>
+        </p:txBody>
+      </p:sp>
+      <p:sp>
+        <p:nvSpPr>
+          <p:cNvPr id="10" name="CustomShape 2">
+            <a:extLst>
+              <a:ext uri="{FF2B5EF4-FFF2-40B4-BE49-F238E27FC236}">
+                <a16:creationId xmlns:a16="http://schemas.microsoft.com/office/drawing/2014/main" id="{66B63499-87E0-47B0-925C-8209B4D86480}"/>
+              </a:ext>
+            </a:extLst>
+          </p:cNvPr>
+          <p:cNvSpPr/>
+          <p:nvPr/>
+        </p:nvSpPr>
+        <p:spPr>
+          <a:xfrm>
+            <a:off x="6776400" y="6824400"/>
+            <a:ext cx="4303680" cy="127680"/>
+          </a:xfrm>
+          <a:prstGeom prst="rect">
+            <a:avLst/>
+          </a:prstGeom>
+          <a:noFill/>
+          <a:ln>
+            <a:noFill/>
+          </a:ln>
+        </p:spPr>
+        <p:style>
+          <a:lnRef idx="0">
+            <a:scrgbClr r="0" g="0" b="0"/>
+          </a:lnRef>
+          <a:fillRef idx="0">
+            <a:scrgbClr r="0" g="0" b="0"/>
+          </a:fillRef>
+          <a:effectRef idx="0">
+            <a:scrgbClr r="0" g="0" b="0"/>
+          </a:effectRef>
+          <a:fontRef idx="minor"/>
+        </p:style>
+        <p:txBody>
+          <a:bodyPr lIns="0" tIns="0" rIns="0" bIns="0"/>
+          <a:lstStyle/>
+          <a:p>
+            <a:pPr algn="r">
+              <a:lnSpc>
+                <a:spcPct val="100000"/>
+              </a:lnSpc>
+            </a:pPr>
+            <a:r>
+              <a:rPr lang="en-US" sz="800" spc="-1" dirty="0">
+                <a:solidFill>
+                  <a:srgbClr val="FFFFFF"/>
+                </a:solidFill>
+                <a:latin typeface="Arial"/>
+                <a:ea typeface="DejaVu Sans"/>
+              </a:rPr>
+              <a:t>Web-security</a:t>
+            </a:r>
+            <a:endParaRPr lang="en-US" sz="800" spc="-1" dirty="0">
+              <a:latin typeface="Arial"/>
+            </a:endParaRPr>
+          </a:p>
+        </p:txBody>
+      </p:sp>
+      <p:sp>
+        <p:nvSpPr>
+          <p:cNvPr id="11" name="CustomShape 3">
+            <a:extLst>
+              <a:ext uri="{FF2B5EF4-FFF2-40B4-BE49-F238E27FC236}">
+                <a16:creationId xmlns:a16="http://schemas.microsoft.com/office/drawing/2014/main" id="{EF54D517-30CD-4894-BC9B-E9DCA4DAB331}"/>
+              </a:ext>
+            </a:extLst>
+          </p:cNvPr>
+          <p:cNvSpPr/>
+          <p:nvPr/>
+        </p:nvSpPr>
+        <p:spPr>
+          <a:xfrm>
+            <a:off x="11192400" y="6824400"/>
+            <a:ext cx="175680" cy="127680"/>
+          </a:xfrm>
+          <a:prstGeom prst="rect">
+            <a:avLst/>
+          </a:prstGeom>
+          <a:noFill/>
+          <a:ln>
+            <a:noFill/>
+          </a:ln>
+        </p:spPr>
+        <p:style>
+          <a:lnRef idx="0">
+            <a:scrgbClr r="0" g="0" b="0"/>
+          </a:lnRef>
+          <a:fillRef idx="0">
+            <a:scrgbClr r="0" g="0" b="0"/>
+          </a:fillRef>
+          <a:effectRef idx="0">
+            <a:scrgbClr r="0" g="0" b="0"/>
+          </a:effectRef>
+          <a:fontRef idx="minor"/>
+        </p:style>
+        <p:txBody>
+          <a:bodyPr lIns="0" tIns="0" rIns="0" bIns="0"/>
+          <a:lstStyle/>
+          <a:p>
+            <a:pPr algn="r">
+              <a:lnSpc>
+                <a:spcPct val="100000"/>
+              </a:lnSpc>
+            </a:pPr>
+            <a:fld id="{057B226F-AE21-48F5-95C0-A8FDEB7B91DB}" type="slidenum">
+              <a:rPr lang="en-US" sz="800" spc="-1">
+                <a:solidFill>
+                  <a:srgbClr val="FFFFFF"/>
+                </a:solidFill>
+                <a:latin typeface="Arial"/>
+                <a:ea typeface="DejaVu Sans"/>
+              </a:rPr>
+              <a:t>6</a:t>
+            </a:fld>
+            <a:endParaRPr lang="en-US" sz="800" spc="-1">
+              <a:latin typeface="Arial"/>
+            </a:endParaRPr>
+          </a:p>
+        </p:txBody>
+      </p:sp>
+    </p:spTree>
+    <p:extLst>
+      <p:ext uri="{BB962C8B-B14F-4D97-AF65-F5344CB8AC3E}">
+        <p14:creationId xmlns:p14="http://schemas.microsoft.com/office/powerpoint/2010/main" val="1761029249"/>
+      </p:ext>
+    </p:extLst>
+  </p:cSld>
+  <p:clrMapOvr>
+    <a:masterClrMapping/>
+  </p:clrMapOvr>
+  <p:timing>
+    <p:tnLst>
+      <p:par>
+        <p:cTn id="1" dur="indefinite" restart="never" nodeType="tmRoot">
+          <p:childTnLst>
+            <p:seq>
+              <p:cTn id="2" dur="indefinite" nodeType="mainSeq"/>
+              <p:prevCondLst>
+                <p:cond evt="onPrev" delay="0">
+                  <p:tgtEl>
+                    <p:sldTgt/>
+                  </p:tgtEl>
+                </p:cond>
+              </p:prevCondLst>
+              <p:nextCondLst>
+                <p:cond evt="onNext" delay="0">
+                  <p:tgtEl>
+                    <p:sldTgt/>
+                  </p:tgtEl>
+                </p:cond>
+              </p:nextCondLst>
+            </p:seq>
+          </p:childTnLst>
+        </p:cTn>
+      </p:par>
+    </p:tnLst>
+  </p:timing>
+</p:sld>
+</file>
+
+<file path=ppt/slides/slide7.xml><?xml version="1.0" encoding="utf-8"?>
+<p:sld xmlns:a="http://schemas.openxmlformats.org/drawingml/2006/main" xmlns:r="http://schemas.openxmlformats.org/officeDocument/2006/relationships" xmlns:p="http://schemas.openxmlformats.org/presentationml/2006/main">
+  <p:cSld>
+    <p:spTree>
+      <p:nvGrpSpPr>
+        <p:cNvPr id="1" name=""/>
+        <p:cNvGrpSpPr/>
+        <p:nvPr/>
+      </p:nvGrpSpPr>
+      <p:grpSpPr>
+        <a:xfrm>
+          <a:off x="0" y="0"/>
+          <a:ext cx="0" cy="0"/>
+          <a:chOff x="0" y="0"/>
+          <a:chExt cx="0" cy="0"/>
+        </a:xfrm>
+      </p:grpSpPr>
+      <p:sp>
+        <p:nvSpPr>
+          <p:cNvPr id="176" name="CustomShape 1"/>
+          <p:cNvSpPr/>
+          <p:nvPr/>
+        </p:nvSpPr>
+        <p:spPr>
+          <a:xfrm>
+            <a:off x="960000" y="384000"/>
+            <a:ext cx="8815680" cy="655680"/>
+          </a:xfrm>
+          <a:prstGeom prst="rect">
+            <a:avLst/>
+          </a:prstGeom>
+          <a:noFill/>
+          <a:ln>
+            <a:noFill/>
+          </a:ln>
+        </p:spPr>
+        <p:style>
+          <a:lnRef idx="0">
+            <a:scrgbClr r="0" g="0" b="0"/>
+          </a:lnRef>
+          <a:fillRef idx="0">
+            <a:scrgbClr r="0" g="0" b="0"/>
+          </a:fillRef>
+          <a:effectRef idx="0">
+            <a:scrgbClr r="0" g="0" b="0"/>
+          </a:effectRef>
+          <a:fontRef idx="minor"/>
+        </p:style>
+        <p:txBody>
+          <a:bodyPr lIns="0" tIns="0" rIns="0" bIns="0" anchor="ctr"/>
+          <a:lstStyle/>
+          <a:p>
+            <a:pPr>
+              <a:lnSpc>
+                <a:spcPct val="85000"/>
+              </a:lnSpc>
+            </a:pPr>
+            <a:r>
+              <a:rPr lang="en-US" sz="2400" b="1" spc="-1" dirty="0">
+                <a:solidFill>
+                  <a:srgbClr val="E63232"/>
+                </a:solidFill>
+                <a:latin typeface="Arial"/>
+                <a:ea typeface="DejaVu Sans"/>
+              </a:rPr>
+              <a:t>XSS</a:t>
+            </a:r>
+            <a:endParaRPr lang="en-US" sz="2400" spc="-1" dirty="0">
+              <a:latin typeface="Arial"/>
+            </a:endParaRPr>
+          </a:p>
+        </p:txBody>
+      </p:sp>
+      <p:sp>
+        <p:nvSpPr>
+          <p:cNvPr id="177" name="CustomShape 2"/>
+          <p:cNvSpPr/>
+          <p:nvPr/>
+        </p:nvSpPr>
+        <p:spPr>
+          <a:xfrm>
+            <a:off x="6624000" y="6672000"/>
+            <a:ext cx="4303680" cy="127680"/>
+          </a:xfrm>
+          <a:prstGeom prst="rect">
+            <a:avLst/>
+          </a:prstGeom>
+          <a:noFill/>
+          <a:ln>
+            <a:noFill/>
+          </a:ln>
+        </p:spPr>
+        <p:style>
+          <a:lnRef idx="0">
+            <a:scrgbClr r="0" g="0" b="0"/>
+          </a:lnRef>
+          <a:fillRef idx="0">
+            <a:scrgbClr r="0" g="0" b="0"/>
+          </a:fillRef>
+          <a:effectRef idx="0">
+            <a:scrgbClr r="0" g="0" b="0"/>
+          </a:effectRef>
+          <a:fontRef idx="minor"/>
+        </p:style>
+        <p:txBody>
+          <a:bodyPr lIns="0" tIns="0" rIns="0" bIns="0"/>
+          <a:lstStyle/>
+          <a:p>
+            <a:pPr algn="r">
+              <a:lnSpc>
+                <a:spcPct val="100000"/>
+              </a:lnSpc>
+            </a:pPr>
+            <a:r>
+              <a:rPr lang="en-US" sz="800" spc="-1" dirty="0">
+                <a:solidFill>
+                  <a:srgbClr val="FFFFFF"/>
+                </a:solidFill>
+                <a:latin typeface="Arial"/>
+                <a:ea typeface="DejaVu Sans"/>
+              </a:rPr>
+              <a:t>Web-security</a:t>
+            </a:r>
+            <a:endParaRPr lang="en-US" sz="800" spc="-1" dirty="0">
+              <a:latin typeface="Arial"/>
+            </a:endParaRPr>
+          </a:p>
+        </p:txBody>
+      </p:sp>
+      <p:sp>
+        <p:nvSpPr>
+          <p:cNvPr id="178" name="CustomShape 3"/>
+          <p:cNvSpPr/>
+          <p:nvPr/>
+        </p:nvSpPr>
+        <p:spPr>
+          <a:xfrm>
+            <a:off x="11040000" y="6672000"/>
+            <a:ext cx="175680" cy="127680"/>
+          </a:xfrm>
+          <a:prstGeom prst="rect">
+            <a:avLst/>
+          </a:prstGeom>
+          <a:noFill/>
+          <a:ln>
+            <a:noFill/>
+          </a:ln>
+        </p:spPr>
+        <p:style>
+          <a:lnRef idx="0">
+            <a:scrgbClr r="0" g="0" b="0"/>
+          </a:lnRef>
+          <a:fillRef idx="0">
+            <a:scrgbClr r="0" g="0" b="0"/>
+          </a:fillRef>
+          <a:effectRef idx="0">
+            <a:scrgbClr r="0" g="0" b="0"/>
+          </a:effectRef>
+          <a:fontRef idx="minor"/>
+        </p:style>
+        <p:txBody>
+          <a:bodyPr lIns="0" tIns="0" rIns="0" bIns="0"/>
+          <a:lstStyle/>
+          <a:p>
+            <a:pPr algn="r">
+              <a:lnSpc>
+                <a:spcPct val="100000"/>
+              </a:lnSpc>
+            </a:pPr>
+            <a:fld id="{057B226F-AE21-48F5-95C0-A8FDEB7B91DB}" type="slidenum">
+              <a:rPr lang="en-US" sz="800" spc="-1">
+                <a:solidFill>
+                  <a:srgbClr val="FFFFFF"/>
+                </a:solidFill>
+                <a:latin typeface="Arial"/>
+                <a:ea typeface="DejaVu Sans"/>
+              </a:rPr>
+              <a:t>7</a:t>
+            </a:fld>
+            <a:endParaRPr lang="en-US" sz="800" spc="-1">
+              <a:latin typeface="Arial"/>
+            </a:endParaRPr>
+          </a:p>
+        </p:txBody>
+      </p:sp>
+      <p:sp>
+        <p:nvSpPr>
+          <p:cNvPr id="179" name="CustomShape 4"/>
+          <p:cNvSpPr/>
+          <p:nvPr/>
+        </p:nvSpPr>
+        <p:spPr>
+          <a:xfrm>
+            <a:off x="803520" y="672960"/>
+            <a:ext cx="8815680" cy="5166720"/>
+          </a:xfrm>
+          <a:prstGeom prst="rect">
+            <a:avLst/>
+          </a:prstGeom>
+          <a:noFill/>
+          <a:ln>
+            <a:noFill/>
+          </a:ln>
+        </p:spPr>
+        <p:style>
+          <a:lnRef idx="0">
+            <a:scrgbClr r="0" g="0" b="0"/>
+          </a:lnRef>
+          <a:fillRef idx="0">
+            <a:scrgbClr r="0" g="0" b="0"/>
+          </a:fillRef>
+          <a:effectRef idx="0">
+            <a:scrgbClr r="0" g="0" b="0"/>
+          </a:effectRef>
+          <a:fontRef idx="minor"/>
+        </p:style>
+        <p:txBody>
+          <a:bodyPr lIns="0" tIns="0" rIns="0" bIns="0"/>
+          <a:lstStyle/>
+          <a:p>
+            <a:pPr>
+              <a:lnSpc>
+                <a:spcPct val="120000"/>
+              </a:lnSpc>
+            </a:pPr>
+            <a:endParaRPr lang="en-US" sz="2400" spc="-1">
+              <a:latin typeface="Arial"/>
+            </a:endParaRPr>
+          </a:p>
+          <a:p>
+            <a:pPr>
+              <a:lnSpc>
+                <a:spcPct val="120000"/>
+              </a:lnSpc>
+            </a:pPr>
+            <a:endParaRPr lang="en-US" sz="2400" spc="-1">
+              <a:latin typeface="Arial"/>
+            </a:endParaRPr>
+          </a:p>
+        </p:txBody>
+      </p:sp>
+      <p:sp>
+        <p:nvSpPr>
+          <p:cNvPr id="10" name="CustomShape 2">
+            <a:extLst>
+              <a:ext uri="{FF2B5EF4-FFF2-40B4-BE49-F238E27FC236}">
+                <a16:creationId xmlns:a16="http://schemas.microsoft.com/office/drawing/2014/main" id="{66B63499-87E0-47B0-925C-8209B4D86480}"/>
+              </a:ext>
+            </a:extLst>
+          </p:cNvPr>
+          <p:cNvSpPr/>
+          <p:nvPr/>
+        </p:nvSpPr>
+        <p:spPr>
+          <a:xfrm>
+            <a:off x="6776400" y="6824400"/>
+            <a:ext cx="4303680" cy="127680"/>
+          </a:xfrm>
+          <a:prstGeom prst="rect">
+            <a:avLst/>
+          </a:prstGeom>
+          <a:noFill/>
+          <a:ln>
+            <a:noFill/>
+          </a:ln>
+        </p:spPr>
+        <p:style>
+          <a:lnRef idx="0">
+            <a:scrgbClr r="0" g="0" b="0"/>
+          </a:lnRef>
+          <a:fillRef idx="0">
+            <a:scrgbClr r="0" g="0" b="0"/>
+          </a:fillRef>
+          <a:effectRef idx="0">
+            <a:scrgbClr r="0" g="0" b="0"/>
+          </a:effectRef>
+          <a:fontRef idx="minor"/>
+        </p:style>
+        <p:txBody>
+          <a:bodyPr lIns="0" tIns="0" rIns="0" bIns="0"/>
+          <a:lstStyle/>
+          <a:p>
+            <a:pPr algn="r">
+              <a:lnSpc>
+                <a:spcPct val="100000"/>
+              </a:lnSpc>
+            </a:pPr>
+            <a:r>
+              <a:rPr lang="en-US" sz="800" spc="-1" dirty="0">
+                <a:solidFill>
+                  <a:srgbClr val="FFFFFF"/>
+                </a:solidFill>
+                <a:latin typeface="Arial"/>
+                <a:ea typeface="DejaVu Sans"/>
+              </a:rPr>
+              <a:t>Web-security</a:t>
+            </a:r>
+            <a:endParaRPr lang="en-US" sz="800" spc="-1" dirty="0">
+              <a:latin typeface="Arial"/>
+            </a:endParaRPr>
+          </a:p>
+        </p:txBody>
+      </p:sp>
+      <p:sp>
+        <p:nvSpPr>
+          <p:cNvPr id="11" name="CustomShape 3">
+            <a:extLst>
+              <a:ext uri="{FF2B5EF4-FFF2-40B4-BE49-F238E27FC236}">
+                <a16:creationId xmlns:a16="http://schemas.microsoft.com/office/drawing/2014/main" id="{EF54D517-30CD-4894-BC9B-E9DCA4DAB331}"/>
+              </a:ext>
+            </a:extLst>
+          </p:cNvPr>
+          <p:cNvSpPr/>
+          <p:nvPr/>
+        </p:nvSpPr>
+        <p:spPr>
+          <a:xfrm>
+            <a:off x="11192400" y="6824400"/>
+            <a:ext cx="175680" cy="127680"/>
+          </a:xfrm>
+          <a:prstGeom prst="rect">
+            <a:avLst/>
+          </a:prstGeom>
+          <a:noFill/>
+          <a:ln>
+            <a:noFill/>
+          </a:ln>
+        </p:spPr>
+        <p:style>
+          <a:lnRef idx="0">
+            <a:scrgbClr r="0" g="0" b="0"/>
+          </a:lnRef>
+          <a:fillRef idx="0">
+            <a:scrgbClr r="0" g="0" b="0"/>
+          </a:fillRef>
+          <a:effectRef idx="0">
+            <a:scrgbClr r="0" g="0" b="0"/>
+          </a:effectRef>
+          <a:fontRef idx="minor"/>
+        </p:style>
+        <p:txBody>
+          <a:bodyPr lIns="0" tIns="0" rIns="0" bIns="0"/>
+          <a:lstStyle/>
+          <a:p>
+            <a:pPr algn="r">
+              <a:lnSpc>
+                <a:spcPct val="100000"/>
+              </a:lnSpc>
+            </a:pPr>
+            <a:fld id="{057B226F-AE21-48F5-95C0-A8FDEB7B91DB}" type="slidenum">
+              <a:rPr lang="en-US" sz="800" spc="-1">
+                <a:solidFill>
+                  <a:srgbClr val="FFFFFF"/>
+                </a:solidFill>
+                <a:latin typeface="Arial"/>
+                <a:ea typeface="DejaVu Sans"/>
+              </a:rPr>
+              <a:t>7</a:t>
+            </a:fld>
+            <a:endParaRPr lang="en-US" sz="800" spc="-1">
+              <a:latin typeface="Arial"/>
+            </a:endParaRPr>
+          </a:p>
+        </p:txBody>
+      </p:sp>
+    </p:spTree>
+    <p:extLst>
+      <p:ext uri="{BB962C8B-B14F-4D97-AF65-F5344CB8AC3E}">
+        <p14:creationId xmlns:p14="http://schemas.microsoft.com/office/powerpoint/2010/main" val="3961011946"/>
+      </p:ext>
+    </p:extLst>
+  </p:cSld>
+  <p:clrMapOvr>
+    <a:masterClrMapping/>
+  </p:clrMapOvr>
+  <p:timing>
+    <p:tnLst>
+      <p:par>
+        <p:cTn id="1" dur="indefinite" restart="never" nodeType="tmRoot">
+          <p:childTnLst>
+            <p:seq>
+              <p:cTn id="2" dur="indefinite" nodeType="mainSeq"/>
+              <p:prevCondLst>
+                <p:cond evt="onPrev" delay="0">
+                  <p:tgtEl>
+                    <p:sldTgt/>
+                  </p:tgtEl>
+                </p:cond>
+              </p:prevCondLst>
+              <p:nextCondLst>
+                <p:cond evt="onNext" delay="0">
+                  <p:tgtEl>
+                    <p:sldTgt/>
+                  </p:tgtEl>
+                </p:cond>
+              </p:nextCondLst>
+            </p:seq>
+          </p:childTnLst>
+        </p:cTn>
+      </p:par>
+    </p:tnLst>
+  </p:timing>
+</p:sld>
+</file>
+
+<file path=ppt/slides/slide8.xml><?xml version="1.0" encoding="utf-8"?>
+<p:sld xmlns:a="http://schemas.openxmlformats.org/drawingml/2006/main" xmlns:r="http://schemas.openxmlformats.org/officeDocument/2006/relationships" xmlns:p="http://schemas.openxmlformats.org/presentationml/2006/main">
+  <p:cSld>
+    <p:spTree>
+      <p:nvGrpSpPr>
+        <p:cNvPr id="1" name=""/>
+        <p:cNvGrpSpPr/>
+        <p:nvPr/>
+      </p:nvGrpSpPr>
+      <p:grpSpPr>
+        <a:xfrm>
+          <a:off x="0" y="0"/>
+          <a:ext cx="0" cy="0"/>
+          <a:chOff x="0" y="0"/>
+          <a:chExt cx="0" cy="0"/>
+        </a:xfrm>
+      </p:grpSpPr>
+      <p:sp>
+        <p:nvSpPr>
+          <p:cNvPr id="176" name="CustomShape 1"/>
+          <p:cNvSpPr/>
+          <p:nvPr/>
+        </p:nvSpPr>
+        <p:spPr>
+          <a:xfrm>
+            <a:off x="960000" y="384000"/>
+            <a:ext cx="8815680" cy="655680"/>
+          </a:xfrm>
+          <a:prstGeom prst="rect">
+            <a:avLst/>
+          </a:prstGeom>
+          <a:noFill/>
+          <a:ln>
+            <a:noFill/>
+          </a:ln>
+        </p:spPr>
+        <p:style>
+          <a:lnRef idx="0">
+            <a:scrgbClr r="0" g="0" b="0"/>
+          </a:lnRef>
+          <a:fillRef idx="0">
+            <a:scrgbClr r="0" g="0" b="0"/>
+          </a:fillRef>
+          <a:effectRef idx="0">
+            <a:scrgbClr r="0" g="0" b="0"/>
+          </a:effectRef>
+          <a:fontRef idx="minor"/>
+        </p:style>
+        <p:txBody>
+          <a:bodyPr lIns="0" tIns="0" rIns="0" bIns="0" anchor="ctr"/>
+          <a:lstStyle/>
+          <a:p>
+            <a:pPr>
+              <a:lnSpc>
+                <a:spcPct val="85000"/>
+              </a:lnSpc>
+            </a:pPr>
+            <a:r>
+              <a:rPr lang="en-US" sz="2400" b="1" spc="-1">
+                <a:solidFill>
+                  <a:srgbClr val="E63232"/>
+                </a:solidFill>
+                <a:latin typeface="Arial"/>
+                <a:ea typeface="DejaVu Sans"/>
+              </a:rPr>
+              <a:t>CSRF</a:t>
+            </a:r>
+            <a:endParaRPr lang="en-US" sz="2400" spc="-1" dirty="0">
+              <a:latin typeface="Arial"/>
+            </a:endParaRPr>
+          </a:p>
+        </p:txBody>
+      </p:sp>
+      <p:sp>
+        <p:nvSpPr>
+          <p:cNvPr id="177" name="CustomShape 2"/>
+          <p:cNvSpPr/>
+          <p:nvPr/>
+        </p:nvSpPr>
+        <p:spPr>
+          <a:xfrm>
+            <a:off x="6624000" y="6672000"/>
+            <a:ext cx="4303680" cy="127680"/>
+          </a:xfrm>
+          <a:prstGeom prst="rect">
+            <a:avLst/>
+          </a:prstGeom>
+          <a:noFill/>
+          <a:ln>
+            <a:noFill/>
+          </a:ln>
+        </p:spPr>
+        <p:style>
+          <a:lnRef idx="0">
+            <a:scrgbClr r="0" g="0" b="0"/>
+          </a:lnRef>
+          <a:fillRef idx="0">
+            <a:scrgbClr r="0" g="0" b="0"/>
+          </a:fillRef>
+          <a:effectRef idx="0">
+            <a:scrgbClr r="0" g="0" b="0"/>
+          </a:effectRef>
+          <a:fontRef idx="minor"/>
+        </p:style>
+        <p:txBody>
+          <a:bodyPr lIns="0" tIns="0" rIns="0" bIns="0"/>
+          <a:lstStyle/>
+          <a:p>
+            <a:pPr algn="r">
+              <a:lnSpc>
+                <a:spcPct val="100000"/>
+              </a:lnSpc>
+            </a:pPr>
+            <a:r>
+              <a:rPr lang="en-US" sz="800" spc="-1" dirty="0">
+                <a:solidFill>
+                  <a:srgbClr val="FFFFFF"/>
+                </a:solidFill>
+                <a:latin typeface="Arial"/>
+                <a:ea typeface="DejaVu Sans"/>
+              </a:rPr>
+              <a:t>Web-security</a:t>
+            </a:r>
+            <a:endParaRPr lang="en-US" sz="800" spc="-1" dirty="0">
+              <a:latin typeface="Arial"/>
+            </a:endParaRPr>
+          </a:p>
+        </p:txBody>
+      </p:sp>
+      <p:sp>
+        <p:nvSpPr>
+          <p:cNvPr id="178" name="CustomShape 3"/>
+          <p:cNvSpPr/>
+          <p:nvPr/>
+        </p:nvSpPr>
+        <p:spPr>
+          <a:xfrm>
+            <a:off x="11040000" y="6672000"/>
+            <a:ext cx="175680" cy="127680"/>
+          </a:xfrm>
+          <a:prstGeom prst="rect">
+            <a:avLst/>
+          </a:prstGeom>
+          <a:noFill/>
+          <a:ln>
+            <a:noFill/>
+          </a:ln>
+        </p:spPr>
+        <p:style>
+          <a:lnRef idx="0">
+            <a:scrgbClr r="0" g="0" b="0"/>
+          </a:lnRef>
+          <a:fillRef idx="0">
+            <a:scrgbClr r="0" g="0" b="0"/>
+          </a:fillRef>
+          <a:effectRef idx="0">
+            <a:scrgbClr r="0" g="0" b="0"/>
+          </a:effectRef>
+          <a:fontRef idx="minor"/>
+        </p:style>
+        <p:txBody>
+          <a:bodyPr lIns="0" tIns="0" rIns="0" bIns="0"/>
+          <a:lstStyle/>
+          <a:p>
+            <a:pPr algn="r">
+              <a:lnSpc>
+                <a:spcPct val="100000"/>
+              </a:lnSpc>
+            </a:pPr>
+            <a:fld id="{057B226F-AE21-48F5-95C0-A8FDEB7B91DB}" type="slidenum">
+              <a:rPr lang="en-US" sz="800" spc="-1">
+                <a:solidFill>
+                  <a:srgbClr val="FFFFFF"/>
+                </a:solidFill>
+                <a:latin typeface="Arial"/>
+                <a:ea typeface="DejaVu Sans"/>
+              </a:rPr>
+              <a:t>8</a:t>
+            </a:fld>
+            <a:endParaRPr lang="en-US" sz="800" spc="-1">
+              <a:latin typeface="Arial"/>
+            </a:endParaRPr>
+          </a:p>
+        </p:txBody>
+      </p:sp>
+      <p:sp>
+        <p:nvSpPr>
+          <p:cNvPr id="179" name="CustomShape 4"/>
+          <p:cNvSpPr/>
+          <p:nvPr/>
+        </p:nvSpPr>
+        <p:spPr>
+          <a:xfrm>
+            <a:off x="803520" y="672960"/>
+            <a:ext cx="8815680" cy="5166720"/>
+          </a:xfrm>
+          <a:prstGeom prst="rect">
+            <a:avLst/>
+          </a:prstGeom>
+          <a:noFill/>
+          <a:ln>
+            <a:noFill/>
+          </a:ln>
+        </p:spPr>
+        <p:style>
+          <a:lnRef idx="0">
+            <a:scrgbClr r="0" g="0" b="0"/>
+          </a:lnRef>
+          <a:fillRef idx="0">
+            <a:scrgbClr r="0" g="0" b="0"/>
+          </a:fillRef>
+          <a:effectRef idx="0">
+            <a:scrgbClr r="0" g="0" b="0"/>
+          </a:effectRef>
+          <a:fontRef idx="minor"/>
+        </p:style>
+        <p:txBody>
+          <a:bodyPr lIns="0" tIns="0" rIns="0" bIns="0"/>
+          <a:lstStyle/>
+          <a:p>
+            <a:pPr>
+              <a:lnSpc>
+                <a:spcPct val="120000"/>
+              </a:lnSpc>
+            </a:pPr>
+            <a:endParaRPr lang="en-US" sz="2400" spc="-1">
+              <a:latin typeface="Arial"/>
+            </a:endParaRPr>
+          </a:p>
+          <a:p>
+            <a:pPr>
+              <a:lnSpc>
+                <a:spcPct val="120000"/>
+              </a:lnSpc>
+            </a:pPr>
+            <a:endParaRPr lang="en-US" sz="2400" spc="-1">
+              <a:latin typeface="Arial"/>
+            </a:endParaRPr>
+          </a:p>
+        </p:txBody>
+      </p:sp>
+      <p:sp>
+        <p:nvSpPr>
+          <p:cNvPr id="10" name="CustomShape 2">
+            <a:extLst>
+              <a:ext uri="{FF2B5EF4-FFF2-40B4-BE49-F238E27FC236}">
+                <a16:creationId xmlns:a16="http://schemas.microsoft.com/office/drawing/2014/main" id="{66B63499-87E0-47B0-925C-8209B4D86480}"/>
+              </a:ext>
+            </a:extLst>
+          </p:cNvPr>
+          <p:cNvSpPr/>
+          <p:nvPr/>
+        </p:nvSpPr>
+        <p:spPr>
+          <a:xfrm>
+            <a:off x="6776400" y="6824400"/>
+            <a:ext cx="4303680" cy="127680"/>
+          </a:xfrm>
+          <a:prstGeom prst="rect">
+            <a:avLst/>
+          </a:prstGeom>
+          <a:noFill/>
+          <a:ln>
+            <a:noFill/>
+          </a:ln>
+        </p:spPr>
+        <p:style>
+          <a:lnRef idx="0">
+            <a:scrgbClr r="0" g="0" b="0"/>
+          </a:lnRef>
+          <a:fillRef idx="0">
+            <a:scrgbClr r="0" g="0" b="0"/>
+          </a:fillRef>
+          <a:effectRef idx="0">
+            <a:scrgbClr r="0" g="0" b="0"/>
+          </a:effectRef>
+          <a:fontRef idx="minor"/>
+        </p:style>
+        <p:txBody>
+          <a:bodyPr lIns="0" tIns="0" rIns="0" bIns="0"/>
+          <a:lstStyle/>
+          <a:p>
+            <a:pPr algn="r">
+              <a:lnSpc>
+                <a:spcPct val="100000"/>
+              </a:lnSpc>
+            </a:pPr>
+            <a:r>
+              <a:rPr lang="en-US" sz="800" spc="-1" dirty="0">
+                <a:solidFill>
+                  <a:srgbClr val="FFFFFF"/>
+                </a:solidFill>
+                <a:latin typeface="Arial"/>
+                <a:ea typeface="DejaVu Sans"/>
+              </a:rPr>
+              <a:t>Web-security</a:t>
+            </a:r>
+            <a:endParaRPr lang="en-US" sz="800" spc="-1" dirty="0">
+              <a:latin typeface="Arial"/>
+            </a:endParaRPr>
+          </a:p>
+        </p:txBody>
+      </p:sp>
+      <p:sp>
+        <p:nvSpPr>
+          <p:cNvPr id="11" name="CustomShape 3">
+            <a:extLst>
+              <a:ext uri="{FF2B5EF4-FFF2-40B4-BE49-F238E27FC236}">
+                <a16:creationId xmlns:a16="http://schemas.microsoft.com/office/drawing/2014/main" id="{EF54D517-30CD-4894-BC9B-E9DCA4DAB331}"/>
+              </a:ext>
+            </a:extLst>
+          </p:cNvPr>
+          <p:cNvSpPr/>
+          <p:nvPr/>
+        </p:nvSpPr>
+        <p:spPr>
+          <a:xfrm>
+            <a:off x="11192400" y="6824400"/>
+            <a:ext cx="175680" cy="127680"/>
+          </a:xfrm>
+          <a:prstGeom prst="rect">
+            <a:avLst/>
+          </a:prstGeom>
+          <a:noFill/>
+          <a:ln>
+            <a:noFill/>
+          </a:ln>
+        </p:spPr>
+        <p:style>
+          <a:lnRef idx="0">
+            <a:scrgbClr r="0" g="0" b="0"/>
+          </a:lnRef>
+          <a:fillRef idx="0">
+            <a:scrgbClr r="0" g="0" b="0"/>
+          </a:fillRef>
+          <a:effectRef idx="0">
+            <a:scrgbClr r="0" g="0" b="0"/>
+          </a:effectRef>
+          <a:fontRef idx="minor"/>
+        </p:style>
+        <p:txBody>
+          <a:bodyPr lIns="0" tIns="0" rIns="0" bIns="0"/>
+          <a:lstStyle/>
+          <a:p>
+            <a:pPr algn="r">
+              <a:lnSpc>
+                <a:spcPct val="100000"/>
+              </a:lnSpc>
+            </a:pPr>
+            <a:fld id="{057B226F-AE21-48F5-95C0-A8FDEB7B91DB}" type="slidenum">
+              <a:rPr lang="en-US" sz="800" spc="-1">
+                <a:solidFill>
+                  <a:srgbClr val="FFFFFF"/>
+                </a:solidFill>
+                <a:latin typeface="Arial"/>
+                <a:ea typeface="DejaVu Sans"/>
+              </a:rPr>
+              <a:t>8</a:t>
             </a:fld>
             <a:endParaRPr lang="en-US" sz="800" spc="-1">
               <a:latin typeface="Arial"/>
@@ -11646,7 +13500,7 @@
 </p:sld>
 </file>
 
-<file path=ppt/slides/slide6.xml><?xml version="1.0" encoding="utf-8"?>
+<file path=ppt/slides/slide9.xml><?xml version="1.0" encoding="utf-8"?>
 <p:sld xmlns:a="http://schemas.openxmlformats.org/drawingml/2006/main" xmlns:r="http://schemas.openxmlformats.org/officeDocument/2006/relationships" xmlns:p="http://schemas.openxmlformats.org/presentationml/2006/main" show="0">
   <p:cSld>
     <p:spTree>
@@ -11873,7 +13727,7 @@
                 <a:latin typeface="Arial"/>
                 <a:ea typeface="DejaVu Sans"/>
               </a:rPr>
-              <a:t>6</a:t>
+              <a:t>9</a:t>
             </a:fld>
             <a:endParaRPr lang="en-US" sz="800" spc="-1">
               <a:latin typeface="Arial"/>
@@ -11885,502 +13739,6 @@
     <p:extLst>
       <p:ext uri="{BB962C8B-B14F-4D97-AF65-F5344CB8AC3E}">
         <p14:creationId xmlns:p14="http://schemas.microsoft.com/office/powerpoint/2010/main" val="2992801678"/>
-      </p:ext>
-    </p:extLst>
-  </p:cSld>
-  <p:clrMapOvr>
-    <a:masterClrMapping/>
-  </p:clrMapOvr>
-</p:sld>
-</file>
-
-<file path=ppt/slides/slide7.xml><?xml version="1.0" encoding="utf-8"?>
-<p:sld xmlns:a="http://schemas.openxmlformats.org/drawingml/2006/main" xmlns:r="http://schemas.openxmlformats.org/officeDocument/2006/relationships" xmlns:p="http://schemas.openxmlformats.org/presentationml/2006/main">
-  <p:cSld>
-    <p:spTree>
-      <p:nvGrpSpPr>
-        <p:cNvPr id="1" name=""/>
-        <p:cNvGrpSpPr/>
-        <p:nvPr/>
-      </p:nvGrpSpPr>
-      <p:grpSpPr>
-        <a:xfrm>
-          <a:off x="0" y="0"/>
-          <a:ext cx="0" cy="0"/>
-          <a:chOff x="0" y="0"/>
-          <a:chExt cx="0" cy="0"/>
-        </a:xfrm>
-      </p:grpSpPr>
-      <p:pic>
-        <p:nvPicPr>
-          <p:cNvPr id="2" name="Picture Placeholder 6">
-            <a:extLst>
-              <a:ext uri="{FF2B5EF4-FFF2-40B4-BE49-F238E27FC236}">
-                <a16:creationId xmlns:a16="http://schemas.microsoft.com/office/drawing/2014/main" id="{523AF2E7-F04C-4FDF-BC0D-08056D3DC6FC}"/>
-              </a:ext>
-            </a:extLst>
-          </p:cNvPr>
-          <p:cNvPicPr/>
-          <p:nvPr/>
-        </p:nvPicPr>
-        <p:blipFill>
-          <a:blip r:embed="rId2"/>
-          <a:stretch/>
-        </p:blipFill>
-        <p:spPr>
-          <a:xfrm>
-            <a:off x="9134573" y="1088091"/>
-            <a:ext cx="3057427" cy="4666346"/>
-          </a:xfrm>
-          <a:prstGeom prst="rect">
-            <a:avLst/>
-          </a:prstGeom>
-          <a:ln w="9360">
-            <a:solidFill>
-              <a:schemeClr val="bg1"/>
-            </a:solidFill>
-            <a:round/>
-          </a:ln>
-        </p:spPr>
-      </p:pic>
-      <p:sp>
-        <p:nvSpPr>
-          <p:cNvPr id="3" name="CustomShape 2">
-            <a:extLst>
-              <a:ext uri="{FF2B5EF4-FFF2-40B4-BE49-F238E27FC236}">
-                <a16:creationId xmlns:a16="http://schemas.microsoft.com/office/drawing/2014/main" id="{FDFAB5C5-6731-42FB-BCB9-350B21D4E848}"/>
-              </a:ext>
-            </a:extLst>
-          </p:cNvPr>
-          <p:cNvSpPr/>
-          <p:nvPr/>
-        </p:nvSpPr>
-        <p:spPr>
-          <a:xfrm>
-            <a:off x="3304518" y="3136447"/>
-            <a:ext cx="3645720" cy="585106"/>
-          </a:xfrm>
-          <a:prstGeom prst="rect">
-            <a:avLst/>
-          </a:prstGeom>
-          <a:noFill/>
-          <a:ln>
-            <a:noFill/>
-          </a:ln>
-        </p:spPr>
-        <p:style>
-          <a:lnRef idx="0">
-            <a:scrgbClr r="0" g="0" b="0"/>
-          </a:lnRef>
-          <a:fillRef idx="0">
-            <a:scrgbClr r="0" g="0" b="0"/>
-          </a:fillRef>
-          <a:effectRef idx="0">
-            <a:scrgbClr r="0" g="0" b="0"/>
-          </a:effectRef>
-          <a:fontRef idx="minor"/>
-        </p:style>
-        <p:txBody>
-          <a:bodyPr lIns="0" tIns="0" rIns="0" bIns="0"/>
-          <a:lstStyle/>
-          <a:p>
-            <a:pPr>
-              <a:lnSpc>
-                <a:spcPct val="120000"/>
-              </a:lnSpc>
-            </a:pPr>
-            <a:r>
-              <a:rPr lang="en-US" sz="3200" b="0" strike="noStrike" spc="-1" dirty="0">
-                <a:solidFill>
-                  <a:srgbClr val="FFFFFF"/>
-                </a:solidFill>
-                <a:latin typeface="Arial"/>
-                <a:ea typeface="DejaVu Sans"/>
-              </a:rPr>
-              <a:t>Questions?</a:t>
-            </a:r>
-            <a:endParaRPr lang="en-US" sz="3200" b="0" strike="noStrike" spc="-1" dirty="0">
-              <a:latin typeface="Arial"/>
-            </a:endParaRPr>
-          </a:p>
-        </p:txBody>
-      </p:sp>
-      <p:sp>
-        <p:nvSpPr>
-          <p:cNvPr id="4" name="CustomShape 2">
-            <a:extLst>
-              <a:ext uri="{FF2B5EF4-FFF2-40B4-BE49-F238E27FC236}">
-                <a16:creationId xmlns:a16="http://schemas.microsoft.com/office/drawing/2014/main" id="{91EBE4E4-8EA5-4197-958A-B0A51A430A5C}"/>
-              </a:ext>
-            </a:extLst>
-          </p:cNvPr>
-          <p:cNvSpPr/>
-          <p:nvPr/>
-        </p:nvSpPr>
-        <p:spPr>
-          <a:xfrm>
-            <a:off x="6624000" y="6672000"/>
-            <a:ext cx="4303680" cy="127680"/>
-          </a:xfrm>
-          <a:prstGeom prst="rect">
-            <a:avLst/>
-          </a:prstGeom>
-          <a:noFill/>
-          <a:ln>
-            <a:noFill/>
-          </a:ln>
-        </p:spPr>
-        <p:style>
-          <a:lnRef idx="0">
-            <a:scrgbClr r="0" g="0" b="0"/>
-          </a:lnRef>
-          <a:fillRef idx="0">
-            <a:scrgbClr r="0" g="0" b="0"/>
-          </a:fillRef>
-          <a:effectRef idx="0">
-            <a:scrgbClr r="0" g="0" b="0"/>
-          </a:effectRef>
-          <a:fontRef idx="minor"/>
-        </p:style>
-        <p:txBody>
-          <a:bodyPr lIns="0" tIns="0" rIns="0" bIns="0"/>
-          <a:lstStyle/>
-          <a:p>
-            <a:pPr algn="r">
-              <a:lnSpc>
-                <a:spcPct val="100000"/>
-              </a:lnSpc>
-            </a:pPr>
-            <a:r>
-              <a:rPr lang="en-US" sz="800" spc="-1" dirty="0">
-                <a:solidFill>
-                  <a:srgbClr val="FFFFFF"/>
-                </a:solidFill>
-                <a:latin typeface="Arial"/>
-                <a:ea typeface="DejaVu Sans"/>
-              </a:rPr>
-              <a:t>Web-security</a:t>
-            </a:r>
-            <a:endParaRPr lang="en-US" sz="800" spc="-1" dirty="0">
-              <a:latin typeface="Arial"/>
-            </a:endParaRPr>
-          </a:p>
-        </p:txBody>
-      </p:sp>
-      <p:sp>
-        <p:nvSpPr>
-          <p:cNvPr id="5" name="CustomShape 3">
-            <a:extLst>
-              <a:ext uri="{FF2B5EF4-FFF2-40B4-BE49-F238E27FC236}">
-                <a16:creationId xmlns:a16="http://schemas.microsoft.com/office/drawing/2014/main" id="{F38F0632-E051-49A8-AF74-637F60795063}"/>
-              </a:ext>
-            </a:extLst>
-          </p:cNvPr>
-          <p:cNvSpPr/>
-          <p:nvPr/>
-        </p:nvSpPr>
-        <p:spPr>
-          <a:xfrm>
-            <a:off x="11040000" y="6672000"/>
-            <a:ext cx="175680" cy="127680"/>
-          </a:xfrm>
-          <a:prstGeom prst="rect">
-            <a:avLst/>
-          </a:prstGeom>
-          <a:noFill/>
-          <a:ln>
-            <a:noFill/>
-          </a:ln>
-        </p:spPr>
-        <p:style>
-          <a:lnRef idx="0">
-            <a:scrgbClr r="0" g="0" b="0"/>
-          </a:lnRef>
-          <a:fillRef idx="0">
-            <a:scrgbClr r="0" g="0" b="0"/>
-          </a:fillRef>
-          <a:effectRef idx="0">
-            <a:scrgbClr r="0" g="0" b="0"/>
-          </a:effectRef>
-          <a:fontRef idx="minor"/>
-        </p:style>
-        <p:txBody>
-          <a:bodyPr lIns="0" tIns="0" rIns="0" bIns="0"/>
-          <a:lstStyle/>
-          <a:p>
-            <a:pPr algn="r">
-              <a:lnSpc>
-                <a:spcPct val="100000"/>
-              </a:lnSpc>
-            </a:pPr>
-            <a:fld id="{057B226F-AE21-48F5-95C0-A8FDEB7B91DB}" type="slidenum">
-              <a:rPr lang="en-US" sz="800" spc="-1">
-                <a:solidFill>
-                  <a:srgbClr val="FFFFFF"/>
-                </a:solidFill>
-                <a:latin typeface="Arial"/>
-                <a:ea typeface="DejaVu Sans"/>
-              </a:rPr>
-              <a:t>7</a:t>
-            </a:fld>
-            <a:endParaRPr lang="en-US" sz="800" spc="-1">
-              <a:latin typeface="Arial"/>
-            </a:endParaRPr>
-          </a:p>
-        </p:txBody>
-      </p:sp>
-    </p:spTree>
-    <p:extLst>
-      <p:ext uri="{BB962C8B-B14F-4D97-AF65-F5344CB8AC3E}">
-        <p14:creationId xmlns:p14="http://schemas.microsoft.com/office/powerpoint/2010/main" val="2263330210"/>
-      </p:ext>
-    </p:extLst>
-  </p:cSld>
-  <p:clrMapOvr>
-    <a:masterClrMapping/>
-  </p:clrMapOvr>
-</p:sld>
-</file>
-
-<file path=ppt/slides/slide8.xml><?xml version="1.0" encoding="utf-8"?>
-<p:sld xmlns:a="http://schemas.openxmlformats.org/drawingml/2006/main" xmlns:r="http://schemas.openxmlformats.org/officeDocument/2006/relationships" xmlns:p="http://schemas.openxmlformats.org/presentationml/2006/main">
-  <p:cSld>
-    <p:spTree>
-      <p:nvGrpSpPr>
-        <p:cNvPr id="1" name=""/>
-        <p:cNvGrpSpPr/>
-        <p:nvPr/>
-      </p:nvGrpSpPr>
-      <p:grpSpPr>
-        <a:xfrm>
-          <a:off x="0" y="0"/>
-          <a:ext cx="0" cy="0"/>
-          <a:chOff x="0" y="0"/>
-          <a:chExt cx="0" cy="0"/>
-        </a:xfrm>
-      </p:grpSpPr>
-      <p:pic>
-        <p:nvPicPr>
-          <p:cNvPr id="2" name="Picture Placeholder 6">
-            <a:extLst>
-              <a:ext uri="{FF2B5EF4-FFF2-40B4-BE49-F238E27FC236}">
-                <a16:creationId xmlns:a16="http://schemas.microsoft.com/office/drawing/2014/main" id="{523AF2E7-F04C-4FDF-BC0D-08056D3DC6FC}"/>
-              </a:ext>
-            </a:extLst>
-          </p:cNvPr>
-          <p:cNvPicPr/>
-          <p:nvPr/>
-        </p:nvPicPr>
-        <p:blipFill>
-          <a:blip r:embed="rId2"/>
-          <a:stretch/>
-        </p:blipFill>
-        <p:spPr>
-          <a:xfrm>
-            <a:off x="9134573" y="1088091"/>
-            <a:ext cx="3057427" cy="4666346"/>
-          </a:xfrm>
-          <a:prstGeom prst="rect">
-            <a:avLst/>
-          </a:prstGeom>
-          <a:ln w="9360">
-            <a:solidFill>
-              <a:schemeClr val="bg1"/>
-            </a:solidFill>
-            <a:round/>
-          </a:ln>
-        </p:spPr>
-      </p:pic>
-      <p:sp>
-        <p:nvSpPr>
-          <p:cNvPr id="3" name="CustomShape 2">
-            <a:extLst>
-              <a:ext uri="{FF2B5EF4-FFF2-40B4-BE49-F238E27FC236}">
-                <a16:creationId xmlns:a16="http://schemas.microsoft.com/office/drawing/2014/main" id="{FDFAB5C5-6731-42FB-BCB9-350B21D4E848}"/>
-              </a:ext>
-            </a:extLst>
-          </p:cNvPr>
-          <p:cNvSpPr/>
-          <p:nvPr/>
-        </p:nvSpPr>
-        <p:spPr>
-          <a:xfrm>
-            <a:off x="3304518" y="3136447"/>
-            <a:ext cx="3645720" cy="585106"/>
-          </a:xfrm>
-          <a:prstGeom prst="rect">
-            <a:avLst/>
-          </a:prstGeom>
-          <a:noFill/>
-          <a:ln>
-            <a:noFill/>
-          </a:ln>
-        </p:spPr>
-        <p:style>
-          <a:lnRef idx="0">
-            <a:scrgbClr r="0" g="0" b="0"/>
-          </a:lnRef>
-          <a:fillRef idx="0">
-            <a:scrgbClr r="0" g="0" b="0"/>
-          </a:fillRef>
-          <a:effectRef idx="0">
-            <a:scrgbClr r="0" g="0" b="0"/>
-          </a:effectRef>
-          <a:fontRef idx="minor"/>
-        </p:style>
-        <p:txBody>
-          <a:bodyPr lIns="0" tIns="0" rIns="0" bIns="0"/>
-          <a:lstStyle/>
-          <a:p>
-            <a:pPr>
-              <a:lnSpc>
-                <a:spcPct val="120000"/>
-              </a:lnSpc>
-            </a:pPr>
-            <a:r>
-              <a:rPr lang="en-US" sz="3200" b="0" strike="noStrike" spc="-1" dirty="0">
-                <a:solidFill>
-                  <a:srgbClr val="FFFFFF"/>
-                </a:solidFill>
-                <a:latin typeface="Arial"/>
-                <a:ea typeface="DejaVu Sans"/>
-              </a:rPr>
-              <a:t>Hands-on</a:t>
-            </a:r>
-            <a:endParaRPr lang="en-US" sz="3200" b="0" strike="noStrike" spc="-1" dirty="0">
-              <a:latin typeface="Arial"/>
-            </a:endParaRPr>
-          </a:p>
-        </p:txBody>
-      </p:sp>
-      <p:sp>
-        <p:nvSpPr>
-          <p:cNvPr id="4" name="CustomShape 2">
-            <a:extLst>
-              <a:ext uri="{FF2B5EF4-FFF2-40B4-BE49-F238E27FC236}">
-                <a16:creationId xmlns:a16="http://schemas.microsoft.com/office/drawing/2014/main" id="{18D08DDF-914D-407C-A188-1C78A87DC0B1}"/>
-              </a:ext>
-            </a:extLst>
-          </p:cNvPr>
-          <p:cNvSpPr/>
-          <p:nvPr/>
-        </p:nvSpPr>
-        <p:spPr>
-          <a:xfrm>
-            <a:off x="6624000" y="6672000"/>
-            <a:ext cx="4303680" cy="127680"/>
-          </a:xfrm>
-          <a:prstGeom prst="rect">
-            <a:avLst/>
-          </a:prstGeom>
-          <a:noFill/>
-          <a:ln>
-            <a:noFill/>
-          </a:ln>
-        </p:spPr>
-        <p:style>
-          <a:lnRef idx="0">
-            <a:scrgbClr r="0" g="0" b="0"/>
-          </a:lnRef>
-          <a:fillRef idx="0">
-            <a:scrgbClr r="0" g="0" b="0"/>
-          </a:fillRef>
-          <a:effectRef idx="0">
-            <a:scrgbClr r="0" g="0" b="0"/>
-          </a:effectRef>
-          <a:fontRef idx="minor"/>
-        </p:style>
-        <p:txBody>
-          <a:bodyPr lIns="0" tIns="0" rIns="0" bIns="0"/>
-          <a:lstStyle/>
-          <a:p>
-            <a:pPr algn="r">
-              <a:lnSpc>
-                <a:spcPct val="100000"/>
-              </a:lnSpc>
-            </a:pPr>
-            <a:r>
-              <a:rPr lang="en-US" sz="800" spc="-1" dirty="0">
-                <a:solidFill>
-                  <a:srgbClr val="FFFFFF"/>
-                </a:solidFill>
-                <a:latin typeface="Arial"/>
-                <a:ea typeface="DejaVu Sans"/>
-              </a:rPr>
-              <a:t>Web-security</a:t>
-            </a:r>
-            <a:endParaRPr lang="en-US" sz="800" spc="-1" dirty="0">
-              <a:latin typeface="Arial"/>
-            </a:endParaRPr>
-          </a:p>
-        </p:txBody>
-      </p:sp>
-      <p:sp>
-        <p:nvSpPr>
-          <p:cNvPr id="5" name="CustomShape 3">
-            <a:extLst>
-              <a:ext uri="{FF2B5EF4-FFF2-40B4-BE49-F238E27FC236}">
-                <a16:creationId xmlns:a16="http://schemas.microsoft.com/office/drawing/2014/main" id="{34694A8F-3DF8-4121-8C33-527DBF03A5EA}"/>
-              </a:ext>
-            </a:extLst>
-          </p:cNvPr>
-          <p:cNvSpPr/>
-          <p:nvPr/>
-        </p:nvSpPr>
-        <p:spPr>
-          <a:xfrm>
-            <a:off x="11040000" y="6672000"/>
-            <a:ext cx="175680" cy="127680"/>
-          </a:xfrm>
-          <a:prstGeom prst="rect">
-            <a:avLst/>
-          </a:prstGeom>
-          <a:noFill/>
-          <a:ln>
-            <a:noFill/>
-          </a:ln>
-        </p:spPr>
-        <p:style>
-          <a:lnRef idx="0">
-            <a:scrgbClr r="0" g="0" b="0"/>
-          </a:lnRef>
-          <a:fillRef idx="0">
-            <a:scrgbClr r="0" g="0" b="0"/>
-          </a:fillRef>
-          <a:effectRef idx="0">
-            <a:scrgbClr r="0" g="0" b="0"/>
-          </a:effectRef>
-          <a:fontRef idx="minor"/>
-        </p:style>
-        <p:txBody>
-          <a:bodyPr lIns="0" tIns="0" rIns="0" bIns="0"/>
-          <a:lstStyle/>
-          <a:p>
-            <a:pPr algn="r">
-              <a:lnSpc>
-                <a:spcPct val="100000"/>
-              </a:lnSpc>
-            </a:pPr>
-            <a:fld id="{057B226F-AE21-48F5-95C0-A8FDEB7B91DB}" type="slidenum">
-              <a:rPr lang="en-US" sz="800" spc="-1">
-                <a:solidFill>
-                  <a:srgbClr val="FFFFFF"/>
-                </a:solidFill>
-                <a:latin typeface="Arial"/>
-                <a:ea typeface="DejaVu Sans"/>
-              </a:rPr>
-              <a:t>8</a:t>
-            </a:fld>
-            <a:endParaRPr lang="en-US" sz="800" spc="-1">
-              <a:latin typeface="Arial"/>
-            </a:endParaRPr>
-          </a:p>
-        </p:txBody>
-      </p:sp>
-    </p:spTree>
-    <p:extLst>
-      <p:ext uri="{BB962C8B-B14F-4D97-AF65-F5344CB8AC3E}">
-        <p14:creationId xmlns:p14="http://schemas.microsoft.com/office/powerpoint/2010/main" val="2206085251"/>
       </p:ext>
     </p:extLst>
   </p:cSld>

</xml_diff>